<commit_message>
commiting work from wd pc
</commit_message>
<xml_diff>
--- a/NIS2.pptx
+++ b/NIS2.pptx
@@ -1547,8 +1547,8 @@
         </p:nvSpPr>
         <p:spPr>
           <a:xfrm>
-            <a:off x="139959" y="1567544"/>
-            <a:ext cx="9843061" cy="3645910"/>
+            <a:off x="249016" y="1644547"/>
+            <a:ext cx="9532547" cy="3414766"/>
           </a:xfrm>
         </p:spPr>
         <p:txBody>
@@ -2077,41 +2077,25 @@
           <a:lstStyle/>
           <a:p>
             <a:r>
-              <a:rPr lang="cs-CZ" sz="2000" dirty="0">
-                <a:effectLst/>
-                <a:latin typeface="Arial" panose="020B0604020202020204" pitchFamily="34" charset="0"/>
-                <a:ea typeface="Arial" panose="020B0604020202020204" pitchFamily="34" charset="0"/>
-              </a:rPr>
-              <a:t>Pacienti hospitalizovaní ve zdravotnickém zařízení dnes očekávají možnost přístupu k Internetu (práce, kontakt s rodinou ).. Běžně používají zařízení různého typu (telefon, NTB…). </a:t>
-            </a:r>
-          </a:p>
-          <a:p>
-            <a:r>
-              <a:rPr lang="cs-CZ" sz="2000" dirty="0">
-                <a:effectLst/>
-                <a:latin typeface="Arial" panose="020B0604020202020204" pitchFamily="34" charset="0"/>
-                <a:ea typeface="Arial" panose="020B0604020202020204" pitchFamily="34" charset="0"/>
-              </a:rPr>
-              <a:t>Při nedodržení jasné bezpečnostní politiky hrozí nebezpečí, že se pacient dostane do vnitřního IS dané nemocnice. </a:t>
-            </a:r>
-          </a:p>
-          <a:p>
-            <a:r>
-              <a:rPr lang="cs-CZ" sz="2000" dirty="0">
-                <a:effectLst/>
-                <a:latin typeface="Arial" panose="020B0604020202020204" pitchFamily="34" charset="0"/>
-                <a:ea typeface="Arial" panose="020B0604020202020204" pitchFamily="34" charset="0"/>
-              </a:rPr>
-              <a:t>Student zanalyzuje teoreticky stav v menší nemocnici a navrhne jasná pravidla pro zabezpečení. Např. oddělení  jednotlivých IS, nemožnost odposlechnout data, fyzická bezpečnost (pacient není sám ponechán v ordinaci s otevřeným počítačem personálu atd.). Student tato nebezpečí shrne a navrhne základní ochranu proti nim.</a:t>
-            </a:r>
-            <a:endParaRPr lang="en-US" sz="2000" dirty="0">
-              <a:effectLst/>
-              <a:latin typeface="Arial" panose="020B0604020202020204" pitchFamily="34" charset="0"/>
-              <a:ea typeface="Arial" panose="020B0604020202020204" pitchFamily="34" charset="0"/>
-            </a:endParaRPr>
-          </a:p>
-          <a:p>
-            <a:endParaRPr lang="en-US" sz="2800" dirty="0"/>
+              <a:rPr lang="en-US" sz="2800" dirty="0"/>
+              <a:t>NIS1 – </a:t>
+            </a:r>
+            <a:r>
+              <a:rPr lang="en-US" sz="2800" dirty="0" err="1"/>
+              <a:t>direktiva</a:t>
+            </a:r>
+            <a:r>
+              <a:rPr lang="en-US" sz="2800" dirty="0"/>
+              <a:t> od EU v </a:t>
+            </a:r>
+            <a:r>
+              <a:rPr lang="en-US" sz="2800" dirty="0" err="1"/>
+              <a:t>roce</a:t>
+            </a:r>
+            <a:r>
+              <a:rPr lang="en-US" sz="2800" dirty="0"/>
+              <a:t> 2016</a:t>
+            </a:r>
           </a:p>
         </p:txBody>
       </p:sp>

</xml_diff>